<commit_message>
updated results in ptt
</commit_message>
<xml_diff>
--- a/results_w_CI.pptx
+++ b/results_w_CI.pptx
@@ -108,6 +108,11 @@
       </a:defRPr>
     </a:lvl9pPr>
   </p:defaultTextStyle>
+  <p:extLst>
+    <p:ext uri="{EFAFB233-063F-42B5-8137-9DF3F51BA10A}">
+      <p15:sldGuideLst xmlns:p15="http://schemas.microsoft.com/office/powerpoint/2012/main"/>
+    </p:ext>
+  </p:extLst>
 </p:presentation>
 </file>
 
@@ -505,33 +510,7 @@
           <a:bodyPr/>
           <a:lstStyle/>
           <a:p>
-            <a:r>
-              <a:rPr lang="en-CA" dirty="0"/>
-              <a:t>The next higher damage group was MD&lt;10%. All hit rates rose. UKGTS jumped up above MHPA. In the Euler plot, the hit rates began overlapping much better. </a:t>
-            </a:r>
-          </a:p>
-          <a:p>
             <a:endParaRPr lang="en-CA" dirty="0"/>
-          </a:p>
-          <a:p>
-            <a:r>
-              <a:rPr lang="en-CA" dirty="0"/>
-              <a:t>These trends continued through the rest of the subgroups.</a:t>
-            </a:r>
-            <a:r>
-              <a:rPr lang="en-CA" baseline="0" dirty="0"/>
-              <a:t> The hit rates became better with more functional damage.</a:t>
-            </a:r>
-            <a:endParaRPr lang="en-CA" dirty="0"/>
-          </a:p>
-          <a:p>
-            <a:endParaRPr lang="en-CA" dirty="0"/>
-          </a:p>
-          <a:p>
-            <a:r>
-              <a:rPr lang="en-CA" dirty="0"/>
-              <a:t>UKGTS seems to be the superior criteria because it had the highest hit rate in the high damage groups and low hit rate in the least damage group.</a:t>
-            </a:r>
           </a:p>
         </p:txBody>
       </p:sp>
@@ -615,54 +594,7 @@
           <a:bodyPr/>
           <a:lstStyle/>
           <a:p>
-            <a:r>
-              <a:rPr lang="en-CA" dirty="0"/>
-              <a:t>Here is the comparison of criteria hit rates stratified according to structural damage levels. There were 4 levels.</a:t>
-            </a:r>
-          </a:p>
-          <a:p>
             <a:endParaRPr lang="en-CA" dirty="0"/>
-          </a:p>
-          <a:p>
-            <a:r>
-              <a:rPr lang="en-CA" dirty="0"/>
-              <a:t>In the group with least damage, score of 0, GHT and Foster had the low hit rates while MHPA and UKGTS had high hit rates.</a:t>
-            </a:r>
-          </a:p>
-          <a:p>
-            <a:r>
-              <a:rPr lang="en-CA" dirty="0"/>
-              <a:t>With more structural damage, all hit rates rose. The criteria were also able to pick up many more patients based on the Euler diagrams. </a:t>
-            </a:r>
-          </a:p>
-          <a:p>
-            <a:r>
-              <a:rPr lang="en-CA" dirty="0"/>
-              <a:t>In the next groups, hit rates rose even more. The hit rates began overlapping much more.</a:t>
-            </a:r>
-          </a:p>
-          <a:p>
-            <a:endParaRPr lang="en-CA" dirty="0"/>
-          </a:p>
-          <a:p>
-            <a:r>
-              <a:rPr lang="en-CA" dirty="0"/>
-              <a:t>MHPA and UKGTS had</a:t>
-            </a:r>
-            <a:r>
-              <a:rPr lang="en-CA" baseline="0" dirty="0"/>
-              <a:t> the highest hit rates </a:t>
-            </a:r>
-            <a:r>
-              <a:rPr lang="en-CA" dirty="0"/>
-              <a:t>in the most severe disease group. This demonstrates higher relative sensitivity.</a:t>
-            </a:r>
-          </a:p>
-          <a:p>
-            <a:r>
-              <a:rPr lang="en-CA" dirty="0"/>
-              <a:t>GHT and Foster have the lowest hit rates in the low damage groups, which implies higher relative specificities.</a:t>
-            </a:r>
           </a:p>
         </p:txBody>
       </p:sp>
@@ -3564,7 +3496,7 @@
           <p:cNvPr id="2" name="Group 1">
             <a:extLst>
               <a:ext uri="{FF2B5EF4-FFF2-40B4-BE49-F238E27FC236}">
-                <a16:creationId xmlns:a16="http://schemas.microsoft.com/office/drawing/2014/main" xmlns="" id="{AFB5539E-9F87-4F16-BA84-99727D7DEDEC}"/>
+                <a16:creationId xmlns="" xmlns:a16="http://schemas.microsoft.com/office/drawing/2014/main" id="{AFB5539E-9F87-4F16-BA84-99727D7DEDEC}"/>
               </a:ext>
             </a:extLst>
           </p:cNvPr>
@@ -3957,7 +3889,7 @@
             <p:cNvPr id="96" name="TextBox 95">
               <a:extLst>
                 <a:ext uri="{FF2B5EF4-FFF2-40B4-BE49-F238E27FC236}">
-                  <a16:creationId xmlns:a16="http://schemas.microsoft.com/office/drawing/2014/main" xmlns="" id="{8D1A075D-964B-4005-9D84-409E89B43BA2}"/>
+                  <a16:creationId xmlns="" xmlns:a16="http://schemas.microsoft.com/office/drawing/2014/main" id="{8D1A075D-964B-4005-9D84-409E89B43BA2}"/>
                 </a:ext>
               </a:extLst>
             </p:cNvPr>
@@ -3996,7 +3928,7 @@
             <p:cNvPr id="123" name="TextBox 122">
               <a:extLst>
                 <a:ext uri="{FF2B5EF4-FFF2-40B4-BE49-F238E27FC236}">
-                  <a16:creationId xmlns:a16="http://schemas.microsoft.com/office/drawing/2014/main" xmlns="" id="{7FC13A6C-A90F-4710-A2D9-6C8D802FB483}"/>
+                  <a16:creationId xmlns="" xmlns:a16="http://schemas.microsoft.com/office/drawing/2014/main" id="{7FC13A6C-A90F-4710-A2D9-6C8D802FB483}"/>
                 </a:ext>
               </a:extLst>
             </p:cNvPr>
@@ -4040,7 +3972,7 @@
           <p:cNvPr id="25" name="Group 24">
             <a:extLst>
               <a:ext uri="{FF2B5EF4-FFF2-40B4-BE49-F238E27FC236}">
-                <a16:creationId xmlns:a16="http://schemas.microsoft.com/office/drawing/2014/main" xmlns="" id="{79BC88F8-8827-4E23-B62F-1D2FCA25A51C}"/>
+                <a16:creationId xmlns="" xmlns:a16="http://schemas.microsoft.com/office/drawing/2014/main" id="{79BC88F8-8827-4E23-B62F-1D2FCA25A51C}"/>
               </a:ext>
             </a:extLst>
           </p:cNvPr>
@@ -4060,7 +3992,7 @@
             <p:cNvPr id="30" name="Group 29">
               <a:extLst>
                 <a:ext uri="{FF2B5EF4-FFF2-40B4-BE49-F238E27FC236}">
-                  <a16:creationId xmlns:a16="http://schemas.microsoft.com/office/drawing/2014/main" xmlns="" id="{DFE08800-98D0-4D7B-9D2D-4A209B056808}"/>
+                  <a16:creationId xmlns="" xmlns:a16="http://schemas.microsoft.com/office/drawing/2014/main" id="{DFE08800-98D0-4D7B-9D2D-4A209B056808}"/>
                 </a:ext>
               </a:extLst>
             </p:cNvPr>
@@ -4080,7 +4012,7 @@
               <p:cNvPr id="32" name="Group 31">
                 <a:extLst>
                   <a:ext uri="{FF2B5EF4-FFF2-40B4-BE49-F238E27FC236}">
-                    <a16:creationId xmlns:a16="http://schemas.microsoft.com/office/drawing/2014/main" xmlns="" id="{AE71805E-9D2C-4B4A-893B-906D6EF27CB5}"/>
+                    <a16:creationId xmlns="" xmlns:a16="http://schemas.microsoft.com/office/drawing/2014/main" id="{AE71805E-9D2C-4B4A-893B-906D6EF27CB5}"/>
                   </a:ext>
                 </a:extLst>
               </p:cNvPr>
@@ -4100,7 +4032,7 @@
                 <p:cNvPr id="36" name="Oval 35">
                   <a:extLst>
                     <a:ext uri="{FF2B5EF4-FFF2-40B4-BE49-F238E27FC236}">
-                      <a16:creationId xmlns:a16="http://schemas.microsoft.com/office/drawing/2014/main" xmlns="" id="{4F8D708F-A651-4889-BE36-520D7985AA6F}"/>
+                      <a16:creationId xmlns="" xmlns:a16="http://schemas.microsoft.com/office/drawing/2014/main" id="{4F8D708F-A651-4889-BE36-520D7985AA6F}"/>
                     </a:ext>
                   </a:extLst>
                 </p:cNvPr>
@@ -4157,7 +4089,7 @@
                 <p:cNvPr id="37" name="Oval 36">
                   <a:extLst>
                     <a:ext uri="{FF2B5EF4-FFF2-40B4-BE49-F238E27FC236}">
-                      <a16:creationId xmlns:a16="http://schemas.microsoft.com/office/drawing/2014/main" xmlns="" id="{06B17F9C-980C-46E5-8382-B83E3A6D8661}"/>
+                      <a16:creationId xmlns="" xmlns:a16="http://schemas.microsoft.com/office/drawing/2014/main" id="{06B17F9C-980C-46E5-8382-B83E3A6D8661}"/>
                     </a:ext>
                   </a:extLst>
                 </p:cNvPr>
@@ -4214,7 +4146,7 @@
                 <p:cNvPr id="38" name="Oval 37">
                   <a:extLst>
                     <a:ext uri="{FF2B5EF4-FFF2-40B4-BE49-F238E27FC236}">
-                      <a16:creationId xmlns:a16="http://schemas.microsoft.com/office/drawing/2014/main" xmlns="" id="{E963169B-6C58-4DBA-BE20-C599E305B034}"/>
+                      <a16:creationId xmlns="" xmlns:a16="http://schemas.microsoft.com/office/drawing/2014/main" id="{E963169B-6C58-4DBA-BE20-C599E305B034}"/>
                     </a:ext>
                   </a:extLst>
                 </p:cNvPr>
@@ -4272,7 +4204,7 @@
                 <p:cNvPr id="39" name="Oval 38">
                   <a:extLst>
                     <a:ext uri="{FF2B5EF4-FFF2-40B4-BE49-F238E27FC236}">
-                      <a16:creationId xmlns:a16="http://schemas.microsoft.com/office/drawing/2014/main" xmlns="" id="{5A87E780-B71E-4FBF-9498-7D567A6D53A7}"/>
+                      <a16:creationId xmlns="" xmlns:a16="http://schemas.microsoft.com/office/drawing/2014/main" id="{5A87E780-B71E-4FBF-9498-7D567A6D53A7}"/>
                     </a:ext>
                   </a:extLst>
                 </p:cNvPr>
@@ -4334,7 +4266,7 @@
               <p:cNvPr id="33" name="TextBox 32">
                 <a:extLst>
                   <a:ext uri="{FF2B5EF4-FFF2-40B4-BE49-F238E27FC236}">
-                    <a16:creationId xmlns:a16="http://schemas.microsoft.com/office/drawing/2014/main" xmlns="" id="{EA708170-321E-46CF-8EA1-07CCF97AE2E1}"/>
+                    <a16:creationId xmlns="" xmlns:a16="http://schemas.microsoft.com/office/drawing/2014/main" id="{EA708170-321E-46CF-8EA1-07CCF97AE2E1}"/>
                   </a:ext>
                 </a:extLst>
               </p:cNvPr>
@@ -4373,7 +4305,7 @@
               <p:cNvPr id="34" name="TextBox 33">
                 <a:extLst>
                   <a:ext uri="{FF2B5EF4-FFF2-40B4-BE49-F238E27FC236}">
-                    <a16:creationId xmlns:a16="http://schemas.microsoft.com/office/drawing/2014/main" xmlns="" id="{6DA641AC-1D5E-4808-B466-4A26CFB88262}"/>
+                    <a16:creationId xmlns="" xmlns:a16="http://schemas.microsoft.com/office/drawing/2014/main" id="{6DA641AC-1D5E-4808-B466-4A26CFB88262}"/>
                   </a:ext>
                 </a:extLst>
               </p:cNvPr>
@@ -4413,7 +4345,7 @@
               <p:cNvPr id="35" name="TextBox 34">
                 <a:extLst>
                   <a:ext uri="{FF2B5EF4-FFF2-40B4-BE49-F238E27FC236}">
-                    <a16:creationId xmlns:a16="http://schemas.microsoft.com/office/drawing/2014/main" xmlns="" id="{EE2B61B5-7684-49C0-9906-EB0117114C82}"/>
+                    <a16:creationId xmlns="" xmlns:a16="http://schemas.microsoft.com/office/drawing/2014/main" id="{EE2B61B5-7684-49C0-9906-EB0117114C82}"/>
                   </a:ext>
                 </a:extLst>
               </p:cNvPr>
@@ -4454,7 +4386,7 @@
             <p:cNvPr id="31" name="TextBox 30">
               <a:extLst>
                 <a:ext uri="{FF2B5EF4-FFF2-40B4-BE49-F238E27FC236}">
-                  <a16:creationId xmlns:a16="http://schemas.microsoft.com/office/drawing/2014/main" xmlns="" id="{C75CBEE4-98E1-481B-A2FB-D30736FCEA45}"/>
+                  <a16:creationId xmlns="" xmlns:a16="http://schemas.microsoft.com/office/drawing/2014/main" id="{C75CBEE4-98E1-481B-A2FB-D30736FCEA45}"/>
                 </a:ext>
               </a:extLst>
             </p:cNvPr>
@@ -4498,7 +4430,7 @@
           <p:cNvPr id="40" name="Group 39">
             <a:extLst>
               <a:ext uri="{FF2B5EF4-FFF2-40B4-BE49-F238E27FC236}">
-                <a16:creationId xmlns:a16="http://schemas.microsoft.com/office/drawing/2014/main" xmlns="" id="{0C264D77-77ED-4C50-9078-D9588FCAE302}"/>
+                <a16:creationId xmlns="" xmlns:a16="http://schemas.microsoft.com/office/drawing/2014/main" id="{0C264D77-77ED-4C50-9078-D9588FCAE302}"/>
               </a:ext>
             </a:extLst>
           </p:cNvPr>
@@ -4518,7 +4450,7 @@
             <p:cNvPr id="41" name="Group 40">
               <a:extLst>
                 <a:ext uri="{FF2B5EF4-FFF2-40B4-BE49-F238E27FC236}">
-                  <a16:creationId xmlns:a16="http://schemas.microsoft.com/office/drawing/2014/main" xmlns="" id="{B4C4485E-0D59-4AB0-B0A4-74A1DD1834E6}"/>
+                  <a16:creationId xmlns="" xmlns:a16="http://schemas.microsoft.com/office/drawing/2014/main" id="{B4C4485E-0D59-4AB0-B0A4-74A1DD1834E6}"/>
                 </a:ext>
               </a:extLst>
             </p:cNvPr>
@@ -4538,7 +4470,7 @@
               <p:cNvPr id="43" name="Group 42">
                 <a:extLst>
                   <a:ext uri="{FF2B5EF4-FFF2-40B4-BE49-F238E27FC236}">
-                    <a16:creationId xmlns:a16="http://schemas.microsoft.com/office/drawing/2014/main" xmlns="" id="{72BDA222-9848-4E26-BEE2-6574659C2580}"/>
+                    <a16:creationId xmlns="" xmlns:a16="http://schemas.microsoft.com/office/drawing/2014/main" id="{72BDA222-9848-4E26-BEE2-6574659C2580}"/>
                   </a:ext>
                 </a:extLst>
               </p:cNvPr>
@@ -4558,7 +4490,7 @@
                 <p:cNvPr id="45" name="Group 44">
                   <a:extLst>
                     <a:ext uri="{FF2B5EF4-FFF2-40B4-BE49-F238E27FC236}">
-                      <a16:creationId xmlns:a16="http://schemas.microsoft.com/office/drawing/2014/main" xmlns="" id="{D903E7EA-24E1-4D93-914D-A68B039D5F3D}"/>
+                      <a16:creationId xmlns="" xmlns:a16="http://schemas.microsoft.com/office/drawing/2014/main" id="{D903E7EA-24E1-4D93-914D-A68B039D5F3D}"/>
                     </a:ext>
                   </a:extLst>
                 </p:cNvPr>
@@ -4578,7 +4510,7 @@
                   <p:cNvPr id="52" name="Oval 51">
                     <a:extLst>
                       <a:ext uri="{FF2B5EF4-FFF2-40B4-BE49-F238E27FC236}">
-                        <a16:creationId xmlns:a16="http://schemas.microsoft.com/office/drawing/2014/main" xmlns="" id="{C2F43FC0-C549-4856-8921-A7E64B0F39C5}"/>
+                        <a16:creationId xmlns="" xmlns:a16="http://schemas.microsoft.com/office/drawing/2014/main" id="{C2F43FC0-C549-4856-8921-A7E64B0F39C5}"/>
                       </a:ext>
                     </a:extLst>
                   </p:cNvPr>
@@ -4635,7 +4567,7 @@
                   <p:cNvPr id="54" name="Oval 53">
                     <a:extLst>
                       <a:ext uri="{FF2B5EF4-FFF2-40B4-BE49-F238E27FC236}">
-                        <a16:creationId xmlns:a16="http://schemas.microsoft.com/office/drawing/2014/main" xmlns="" id="{51D6D3D3-8047-4691-9EA0-34F877FC6C15}"/>
+                        <a16:creationId xmlns="" xmlns:a16="http://schemas.microsoft.com/office/drawing/2014/main" id="{51D6D3D3-8047-4691-9EA0-34F877FC6C15}"/>
                       </a:ext>
                     </a:extLst>
                   </p:cNvPr>
@@ -4692,7 +4624,7 @@
                   <p:cNvPr id="55" name="Oval 54">
                     <a:extLst>
                       <a:ext uri="{FF2B5EF4-FFF2-40B4-BE49-F238E27FC236}">
-                        <a16:creationId xmlns:a16="http://schemas.microsoft.com/office/drawing/2014/main" xmlns="" id="{49301636-2137-4DA6-97FA-F12DB9822206}"/>
+                        <a16:creationId xmlns="" xmlns:a16="http://schemas.microsoft.com/office/drawing/2014/main" id="{49301636-2137-4DA6-97FA-F12DB9822206}"/>
                       </a:ext>
                     </a:extLst>
                   </p:cNvPr>
@@ -4750,7 +4682,7 @@
                   <p:cNvPr id="56" name="Oval 55">
                     <a:extLst>
                       <a:ext uri="{FF2B5EF4-FFF2-40B4-BE49-F238E27FC236}">
-                        <a16:creationId xmlns:a16="http://schemas.microsoft.com/office/drawing/2014/main" xmlns="" id="{7A908F5C-AB6F-423E-B6A4-B701D6947F28}"/>
+                        <a16:creationId xmlns="" xmlns:a16="http://schemas.microsoft.com/office/drawing/2014/main" id="{7A908F5C-AB6F-423E-B6A4-B701D6947F28}"/>
                       </a:ext>
                     </a:extLst>
                   </p:cNvPr>
@@ -4812,7 +4744,7 @@
                 <p:cNvPr id="46" name="TextBox 45">
                   <a:extLst>
                     <a:ext uri="{FF2B5EF4-FFF2-40B4-BE49-F238E27FC236}">
-                      <a16:creationId xmlns:a16="http://schemas.microsoft.com/office/drawing/2014/main" xmlns="" id="{C95ECD21-DB51-48EC-AE7B-C786BD07934A}"/>
+                      <a16:creationId xmlns="" xmlns:a16="http://schemas.microsoft.com/office/drawing/2014/main" id="{C95ECD21-DB51-48EC-AE7B-C786BD07934A}"/>
                     </a:ext>
                   </a:extLst>
                 </p:cNvPr>
@@ -4852,7 +4784,7 @@
                 <p:cNvPr id="47" name="TextBox 46">
                   <a:extLst>
                     <a:ext uri="{FF2B5EF4-FFF2-40B4-BE49-F238E27FC236}">
-                      <a16:creationId xmlns:a16="http://schemas.microsoft.com/office/drawing/2014/main" xmlns="" id="{E5B5A626-B60C-4ABF-BAC2-E00677A5E0A5}"/>
+                      <a16:creationId xmlns="" xmlns:a16="http://schemas.microsoft.com/office/drawing/2014/main" id="{E5B5A626-B60C-4ABF-BAC2-E00677A5E0A5}"/>
                     </a:ext>
                   </a:extLst>
                 </p:cNvPr>
@@ -4893,7 +4825,7 @@
               <p:cNvPr id="44" name="TextBox 43">
                 <a:extLst>
                   <a:ext uri="{FF2B5EF4-FFF2-40B4-BE49-F238E27FC236}">
-                    <a16:creationId xmlns:a16="http://schemas.microsoft.com/office/drawing/2014/main" xmlns="" id="{B0C7B0D5-BCE0-4101-84A1-DC4A0D11F928}"/>
+                    <a16:creationId xmlns="" xmlns:a16="http://schemas.microsoft.com/office/drawing/2014/main" id="{B0C7B0D5-BCE0-4101-84A1-DC4A0D11F928}"/>
                   </a:ext>
                 </a:extLst>
               </p:cNvPr>
@@ -4933,7 +4865,7 @@
             <p:cNvPr id="42" name="TextBox 41">
               <a:extLst>
                 <a:ext uri="{FF2B5EF4-FFF2-40B4-BE49-F238E27FC236}">
-                  <a16:creationId xmlns:a16="http://schemas.microsoft.com/office/drawing/2014/main" xmlns="" id="{2C986E37-CCFD-44EC-A0A3-2B0105C1883E}"/>
+                  <a16:creationId xmlns="" xmlns:a16="http://schemas.microsoft.com/office/drawing/2014/main" id="{2C986E37-CCFD-44EC-A0A3-2B0105C1883E}"/>
                 </a:ext>
               </a:extLst>
             </p:cNvPr>
@@ -4977,7 +4909,7 @@
           <p:cNvPr id="57" name="Group 56">
             <a:extLst>
               <a:ext uri="{FF2B5EF4-FFF2-40B4-BE49-F238E27FC236}">
-                <a16:creationId xmlns:a16="http://schemas.microsoft.com/office/drawing/2014/main" xmlns="" id="{6172E669-0C84-480F-B4D0-37F8C37E17B3}"/>
+                <a16:creationId xmlns="" xmlns:a16="http://schemas.microsoft.com/office/drawing/2014/main" id="{6172E669-0C84-480F-B4D0-37F8C37E17B3}"/>
               </a:ext>
             </a:extLst>
           </p:cNvPr>
@@ -4997,7 +4929,7 @@
             <p:cNvPr id="58" name="Group 57">
               <a:extLst>
                 <a:ext uri="{FF2B5EF4-FFF2-40B4-BE49-F238E27FC236}">
-                  <a16:creationId xmlns:a16="http://schemas.microsoft.com/office/drawing/2014/main" xmlns="" id="{D7958CB9-7843-462F-BA3B-5D623FA96BAC}"/>
+                  <a16:creationId xmlns="" xmlns:a16="http://schemas.microsoft.com/office/drawing/2014/main" id="{D7958CB9-7843-462F-BA3B-5D623FA96BAC}"/>
                 </a:ext>
               </a:extLst>
             </p:cNvPr>
@@ -5017,7 +4949,7 @@
               <p:cNvPr id="60" name="Group 59">
                 <a:extLst>
                   <a:ext uri="{FF2B5EF4-FFF2-40B4-BE49-F238E27FC236}">
-                    <a16:creationId xmlns:a16="http://schemas.microsoft.com/office/drawing/2014/main" xmlns="" id="{1589486B-CC81-4834-BCE0-3E29F0CFCAC2}"/>
+                    <a16:creationId xmlns="" xmlns:a16="http://schemas.microsoft.com/office/drawing/2014/main" id="{1589486B-CC81-4834-BCE0-3E29F0CFCAC2}"/>
                   </a:ext>
                 </a:extLst>
               </p:cNvPr>
@@ -5037,7 +4969,7 @@
                 <p:cNvPr id="62" name="Group 61">
                   <a:extLst>
                     <a:ext uri="{FF2B5EF4-FFF2-40B4-BE49-F238E27FC236}">
-                      <a16:creationId xmlns:a16="http://schemas.microsoft.com/office/drawing/2014/main" xmlns="" id="{024EDD71-2465-47E5-A6AC-2C9C6EAB24EB}"/>
+                      <a16:creationId xmlns="" xmlns:a16="http://schemas.microsoft.com/office/drawing/2014/main" id="{024EDD71-2465-47E5-A6AC-2C9C6EAB24EB}"/>
                     </a:ext>
                   </a:extLst>
                 </p:cNvPr>
@@ -5057,7 +4989,7 @@
                   <p:cNvPr id="65" name="Oval 64">
                     <a:extLst>
                       <a:ext uri="{FF2B5EF4-FFF2-40B4-BE49-F238E27FC236}">
-                        <a16:creationId xmlns:a16="http://schemas.microsoft.com/office/drawing/2014/main" xmlns="" id="{69680FB8-66D2-4D99-BAB3-62BCD2D0BFF7}"/>
+                        <a16:creationId xmlns="" xmlns:a16="http://schemas.microsoft.com/office/drawing/2014/main" id="{69680FB8-66D2-4D99-BAB3-62BCD2D0BFF7}"/>
                       </a:ext>
                     </a:extLst>
                   </p:cNvPr>
@@ -5114,7 +5046,7 @@
                   <p:cNvPr id="66" name="Oval 65">
                     <a:extLst>
                       <a:ext uri="{FF2B5EF4-FFF2-40B4-BE49-F238E27FC236}">
-                        <a16:creationId xmlns:a16="http://schemas.microsoft.com/office/drawing/2014/main" xmlns="" id="{E598F5E5-E123-4599-AC9D-9E662BC4BD20}"/>
+                        <a16:creationId xmlns="" xmlns:a16="http://schemas.microsoft.com/office/drawing/2014/main" id="{E598F5E5-E123-4599-AC9D-9E662BC4BD20}"/>
                       </a:ext>
                     </a:extLst>
                   </p:cNvPr>
@@ -5171,7 +5103,7 @@
                   <p:cNvPr id="67" name="Oval 66">
                     <a:extLst>
                       <a:ext uri="{FF2B5EF4-FFF2-40B4-BE49-F238E27FC236}">
-                        <a16:creationId xmlns:a16="http://schemas.microsoft.com/office/drawing/2014/main" xmlns="" id="{2122066F-BB99-4D98-8FA1-5A7509C4DE05}"/>
+                        <a16:creationId xmlns="" xmlns:a16="http://schemas.microsoft.com/office/drawing/2014/main" id="{2122066F-BB99-4D98-8FA1-5A7509C4DE05}"/>
                       </a:ext>
                     </a:extLst>
                   </p:cNvPr>
@@ -5229,7 +5161,7 @@
                   <p:cNvPr id="68" name="Oval 67">
                     <a:extLst>
                       <a:ext uri="{FF2B5EF4-FFF2-40B4-BE49-F238E27FC236}">
-                        <a16:creationId xmlns:a16="http://schemas.microsoft.com/office/drawing/2014/main" xmlns="" id="{28FF4018-9841-4E38-AD2A-1E2017A1F6EE}"/>
+                        <a16:creationId xmlns="" xmlns:a16="http://schemas.microsoft.com/office/drawing/2014/main" id="{28FF4018-9841-4E38-AD2A-1E2017A1F6EE}"/>
                       </a:ext>
                     </a:extLst>
                   </p:cNvPr>
@@ -5291,7 +5223,7 @@
                 <p:cNvPr id="63" name="TextBox 62">
                   <a:extLst>
                     <a:ext uri="{FF2B5EF4-FFF2-40B4-BE49-F238E27FC236}">
-                      <a16:creationId xmlns:a16="http://schemas.microsoft.com/office/drawing/2014/main" xmlns="" id="{3C65F029-D30A-409D-8DE0-2AEC7FABCD39}"/>
+                      <a16:creationId xmlns="" xmlns:a16="http://schemas.microsoft.com/office/drawing/2014/main" id="{3C65F029-D30A-409D-8DE0-2AEC7FABCD39}"/>
                     </a:ext>
                   </a:extLst>
                 </p:cNvPr>
@@ -5330,7 +5262,7 @@
                 <p:cNvPr id="64" name="TextBox 63">
                   <a:extLst>
                     <a:ext uri="{FF2B5EF4-FFF2-40B4-BE49-F238E27FC236}">
-                      <a16:creationId xmlns:a16="http://schemas.microsoft.com/office/drawing/2014/main" xmlns="" id="{19491279-FDE4-4177-ABC7-4FE6828EC23F}"/>
+                      <a16:creationId xmlns="" xmlns:a16="http://schemas.microsoft.com/office/drawing/2014/main" id="{19491279-FDE4-4177-ABC7-4FE6828EC23F}"/>
                     </a:ext>
                   </a:extLst>
                 </p:cNvPr>
@@ -5370,7 +5302,7 @@
               <p:cNvPr id="61" name="TextBox 60">
                 <a:extLst>
                   <a:ext uri="{FF2B5EF4-FFF2-40B4-BE49-F238E27FC236}">
-                    <a16:creationId xmlns:a16="http://schemas.microsoft.com/office/drawing/2014/main" xmlns="" id="{DFA863E0-51CC-4A85-B421-8753FDA2BED6}"/>
+                    <a16:creationId xmlns="" xmlns:a16="http://schemas.microsoft.com/office/drawing/2014/main" id="{DFA863E0-51CC-4A85-B421-8753FDA2BED6}"/>
                   </a:ext>
                 </a:extLst>
               </p:cNvPr>
@@ -5411,7 +5343,7 @@
             <p:cNvPr id="59" name="TextBox 58">
               <a:extLst>
                 <a:ext uri="{FF2B5EF4-FFF2-40B4-BE49-F238E27FC236}">
-                  <a16:creationId xmlns:a16="http://schemas.microsoft.com/office/drawing/2014/main" xmlns="" id="{DD09A2CC-70F9-46EB-96F3-23E5D146D6DB}"/>
+                  <a16:creationId xmlns="" xmlns:a16="http://schemas.microsoft.com/office/drawing/2014/main" id="{DD09A2CC-70F9-46EB-96F3-23E5D146D6DB}"/>
                 </a:ext>
               </a:extLst>
             </p:cNvPr>
@@ -5455,7 +5387,7 @@
           <p:cNvPr id="69" name="Group 68">
             <a:extLst>
               <a:ext uri="{FF2B5EF4-FFF2-40B4-BE49-F238E27FC236}">
-                <a16:creationId xmlns:a16="http://schemas.microsoft.com/office/drawing/2014/main" xmlns="" id="{63A5CEB2-DC7C-41BA-B258-91F0D02711AA}"/>
+                <a16:creationId xmlns="" xmlns:a16="http://schemas.microsoft.com/office/drawing/2014/main" id="{63A5CEB2-DC7C-41BA-B258-91F0D02711AA}"/>
               </a:ext>
             </a:extLst>
           </p:cNvPr>
@@ -5475,7 +5407,7 @@
             <p:cNvPr id="70" name="Group 69">
               <a:extLst>
                 <a:ext uri="{FF2B5EF4-FFF2-40B4-BE49-F238E27FC236}">
-                  <a16:creationId xmlns:a16="http://schemas.microsoft.com/office/drawing/2014/main" xmlns="" id="{5BB46108-4114-42A0-AA0E-B7ED860FEEA8}"/>
+                  <a16:creationId xmlns="" xmlns:a16="http://schemas.microsoft.com/office/drawing/2014/main" id="{5BB46108-4114-42A0-AA0E-B7ED860FEEA8}"/>
                 </a:ext>
               </a:extLst>
             </p:cNvPr>
@@ -5495,7 +5427,7 @@
               <p:cNvPr id="72" name="Group 71">
                 <a:extLst>
                   <a:ext uri="{FF2B5EF4-FFF2-40B4-BE49-F238E27FC236}">
-                    <a16:creationId xmlns:a16="http://schemas.microsoft.com/office/drawing/2014/main" xmlns="" id="{9E8C7DF2-A39A-42E2-8254-137400028F4D}"/>
+                    <a16:creationId xmlns="" xmlns:a16="http://schemas.microsoft.com/office/drawing/2014/main" id="{9E8C7DF2-A39A-42E2-8254-137400028F4D}"/>
                   </a:ext>
                 </a:extLst>
               </p:cNvPr>
@@ -5515,7 +5447,7 @@
                 <p:cNvPr id="74" name="Group 73">
                   <a:extLst>
                     <a:ext uri="{FF2B5EF4-FFF2-40B4-BE49-F238E27FC236}">
-                      <a16:creationId xmlns:a16="http://schemas.microsoft.com/office/drawing/2014/main" xmlns="" id="{C756AE42-2360-4676-92F7-D1D5FC5062E4}"/>
+                      <a16:creationId xmlns="" xmlns:a16="http://schemas.microsoft.com/office/drawing/2014/main" id="{C756AE42-2360-4676-92F7-D1D5FC5062E4}"/>
                     </a:ext>
                   </a:extLst>
                 </p:cNvPr>
@@ -5535,7 +5467,7 @@
                   <p:cNvPr id="77" name="Oval 76">
                     <a:extLst>
                       <a:ext uri="{FF2B5EF4-FFF2-40B4-BE49-F238E27FC236}">
-                        <a16:creationId xmlns:a16="http://schemas.microsoft.com/office/drawing/2014/main" xmlns="" id="{68A84D6A-9A25-46B5-ACE6-0F0FFCE3529E}"/>
+                        <a16:creationId xmlns="" xmlns:a16="http://schemas.microsoft.com/office/drawing/2014/main" id="{68A84D6A-9A25-46B5-ACE6-0F0FFCE3529E}"/>
                       </a:ext>
                     </a:extLst>
                   </p:cNvPr>
@@ -5592,7 +5524,7 @@
                   <p:cNvPr id="78" name="Oval 77">
                     <a:extLst>
                       <a:ext uri="{FF2B5EF4-FFF2-40B4-BE49-F238E27FC236}">
-                        <a16:creationId xmlns:a16="http://schemas.microsoft.com/office/drawing/2014/main" xmlns="" id="{559632C6-330D-41FB-823F-AB43D839BD3F}"/>
+                        <a16:creationId xmlns="" xmlns:a16="http://schemas.microsoft.com/office/drawing/2014/main" id="{559632C6-330D-41FB-823F-AB43D839BD3F}"/>
                       </a:ext>
                     </a:extLst>
                   </p:cNvPr>
@@ -5649,7 +5581,7 @@
                   <p:cNvPr id="79" name="Oval 78">
                     <a:extLst>
                       <a:ext uri="{FF2B5EF4-FFF2-40B4-BE49-F238E27FC236}">
-                        <a16:creationId xmlns:a16="http://schemas.microsoft.com/office/drawing/2014/main" xmlns="" id="{A7E3E3EF-43B0-4B4D-BE5F-77EE7B997F02}"/>
+                        <a16:creationId xmlns="" xmlns:a16="http://schemas.microsoft.com/office/drawing/2014/main" id="{A7E3E3EF-43B0-4B4D-BE5F-77EE7B997F02}"/>
                       </a:ext>
                     </a:extLst>
                   </p:cNvPr>
@@ -5707,7 +5639,7 @@
                   <p:cNvPr id="80" name="Oval 79">
                     <a:extLst>
                       <a:ext uri="{FF2B5EF4-FFF2-40B4-BE49-F238E27FC236}">
-                        <a16:creationId xmlns:a16="http://schemas.microsoft.com/office/drawing/2014/main" xmlns="" id="{76135C05-B2B3-4BFD-86D2-6F1F849E25DD}"/>
+                        <a16:creationId xmlns="" xmlns:a16="http://schemas.microsoft.com/office/drawing/2014/main" id="{76135C05-B2B3-4BFD-86D2-6F1F849E25DD}"/>
                       </a:ext>
                     </a:extLst>
                   </p:cNvPr>
@@ -5769,7 +5701,7 @@
                 <p:cNvPr id="75" name="TextBox 74">
                   <a:extLst>
                     <a:ext uri="{FF2B5EF4-FFF2-40B4-BE49-F238E27FC236}">
-                      <a16:creationId xmlns:a16="http://schemas.microsoft.com/office/drawing/2014/main" xmlns="" id="{1C1547DF-5385-4AAE-AF5D-720A02624C9B}"/>
+                      <a16:creationId xmlns="" xmlns:a16="http://schemas.microsoft.com/office/drawing/2014/main" id="{1C1547DF-5385-4AAE-AF5D-720A02624C9B}"/>
                     </a:ext>
                   </a:extLst>
                 </p:cNvPr>
@@ -5809,7 +5741,7 @@
                 <p:cNvPr id="76" name="TextBox 75">
                   <a:extLst>
                     <a:ext uri="{FF2B5EF4-FFF2-40B4-BE49-F238E27FC236}">
-                      <a16:creationId xmlns:a16="http://schemas.microsoft.com/office/drawing/2014/main" xmlns="" id="{A36D01E8-18DC-4975-B808-15A72D8A2681}"/>
+                      <a16:creationId xmlns="" xmlns:a16="http://schemas.microsoft.com/office/drawing/2014/main" id="{A36D01E8-18DC-4975-B808-15A72D8A2681}"/>
                     </a:ext>
                   </a:extLst>
                 </p:cNvPr>
@@ -5849,7 +5781,7 @@
               <p:cNvPr id="73" name="TextBox 72">
                 <a:extLst>
                   <a:ext uri="{FF2B5EF4-FFF2-40B4-BE49-F238E27FC236}">
-                    <a16:creationId xmlns:a16="http://schemas.microsoft.com/office/drawing/2014/main" xmlns="" id="{00B5F9ED-AECA-4891-9995-86230A56B813}"/>
+                    <a16:creationId xmlns="" xmlns:a16="http://schemas.microsoft.com/office/drawing/2014/main" id="{00B5F9ED-AECA-4891-9995-86230A56B813}"/>
                   </a:ext>
                 </a:extLst>
               </p:cNvPr>
@@ -5889,7 +5821,7 @@
             <p:cNvPr id="71" name="TextBox 70">
               <a:extLst>
                 <a:ext uri="{FF2B5EF4-FFF2-40B4-BE49-F238E27FC236}">
-                  <a16:creationId xmlns:a16="http://schemas.microsoft.com/office/drawing/2014/main" xmlns="" id="{D09EF65C-57D9-4BBE-8E46-F76D7392B51B}"/>
+                  <a16:creationId xmlns="" xmlns:a16="http://schemas.microsoft.com/office/drawing/2014/main" id="{D09EF65C-57D9-4BBE-8E46-F76D7392B51B}"/>
                 </a:ext>
               </a:extLst>
             </p:cNvPr>
@@ -5933,7 +5865,7 @@
           <p:cNvPr id="81" name="Group 80">
             <a:extLst>
               <a:ext uri="{FF2B5EF4-FFF2-40B4-BE49-F238E27FC236}">
-                <a16:creationId xmlns:a16="http://schemas.microsoft.com/office/drawing/2014/main" xmlns="" id="{2A04061C-4A9D-4367-A463-1D80B0E5FA86}"/>
+                <a16:creationId xmlns="" xmlns:a16="http://schemas.microsoft.com/office/drawing/2014/main" id="{2A04061C-4A9D-4367-A463-1D80B0E5FA86}"/>
               </a:ext>
             </a:extLst>
           </p:cNvPr>
@@ -5953,7 +5885,7 @@
             <p:cNvPr id="82" name="Group 81">
               <a:extLst>
                 <a:ext uri="{FF2B5EF4-FFF2-40B4-BE49-F238E27FC236}">
-                  <a16:creationId xmlns:a16="http://schemas.microsoft.com/office/drawing/2014/main" xmlns="" id="{45235B47-2D23-40AB-930F-A57AD944434E}"/>
+                  <a16:creationId xmlns="" xmlns:a16="http://schemas.microsoft.com/office/drawing/2014/main" id="{45235B47-2D23-40AB-930F-A57AD944434E}"/>
                 </a:ext>
               </a:extLst>
             </p:cNvPr>
@@ -5973,7 +5905,7 @@
               <p:cNvPr id="84" name="Group 83">
                 <a:extLst>
                   <a:ext uri="{FF2B5EF4-FFF2-40B4-BE49-F238E27FC236}">
-                    <a16:creationId xmlns:a16="http://schemas.microsoft.com/office/drawing/2014/main" xmlns="" id="{813CE9B1-FE5C-4148-97F5-2C31F79DB8CC}"/>
+                    <a16:creationId xmlns="" xmlns:a16="http://schemas.microsoft.com/office/drawing/2014/main" id="{813CE9B1-FE5C-4148-97F5-2C31F79DB8CC}"/>
                   </a:ext>
                 </a:extLst>
               </p:cNvPr>
@@ -5993,7 +5925,7 @@
                 <p:cNvPr id="86" name="Group 85">
                   <a:extLst>
                     <a:ext uri="{FF2B5EF4-FFF2-40B4-BE49-F238E27FC236}">
-                      <a16:creationId xmlns:a16="http://schemas.microsoft.com/office/drawing/2014/main" xmlns="" id="{CF1BDC8A-BAB3-4522-9F97-33C0FEF3C393}"/>
+                      <a16:creationId xmlns="" xmlns:a16="http://schemas.microsoft.com/office/drawing/2014/main" id="{CF1BDC8A-BAB3-4522-9F97-33C0FEF3C393}"/>
                     </a:ext>
                   </a:extLst>
                 </p:cNvPr>
@@ -6013,7 +5945,7 @@
                   <p:cNvPr id="88" name="Group 87">
                     <a:extLst>
                       <a:ext uri="{FF2B5EF4-FFF2-40B4-BE49-F238E27FC236}">
-                        <a16:creationId xmlns:a16="http://schemas.microsoft.com/office/drawing/2014/main" xmlns="" id="{B06A5FD4-698F-42BF-BAD1-F3A1FD142E38}"/>
+                        <a16:creationId xmlns="" xmlns:a16="http://schemas.microsoft.com/office/drawing/2014/main" id="{B06A5FD4-698F-42BF-BAD1-F3A1FD142E38}"/>
                       </a:ext>
                     </a:extLst>
                   </p:cNvPr>
@@ -6033,7 +5965,7 @@
                     <p:cNvPr id="92" name="Oval 91">
                       <a:extLst>
                         <a:ext uri="{FF2B5EF4-FFF2-40B4-BE49-F238E27FC236}">
-                          <a16:creationId xmlns:a16="http://schemas.microsoft.com/office/drawing/2014/main" xmlns="" id="{6FB8DF73-690F-48CC-9E6B-5C6C58035808}"/>
+                          <a16:creationId xmlns="" xmlns:a16="http://schemas.microsoft.com/office/drawing/2014/main" id="{6FB8DF73-690F-48CC-9E6B-5C6C58035808}"/>
                         </a:ext>
                       </a:extLst>
                     </p:cNvPr>
@@ -6090,7 +6022,7 @@
                     <p:cNvPr id="93" name="Oval 92">
                       <a:extLst>
                         <a:ext uri="{FF2B5EF4-FFF2-40B4-BE49-F238E27FC236}">
-                          <a16:creationId xmlns:a16="http://schemas.microsoft.com/office/drawing/2014/main" xmlns="" id="{8B9A1E3F-43ED-4A11-8278-6F517381E215}"/>
+                          <a16:creationId xmlns="" xmlns:a16="http://schemas.microsoft.com/office/drawing/2014/main" id="{8B9A1E3F-43ED-4A11-8278-6F517381E215}"/>
                         </a:ext>
                       </a:extLst>
                     </p:cNvPr>
@@ -6147,7 +6079,7 @@
                     <p:cNvPr id="94" name="Oval 93">
                       <a:extLst>
                         <a:ext uri="{FF2B5EF4-FFF2-40B4-BE49-F238E27FC236}">
-                          <a16:creationId xmlns:a16="http://schemas.microsoft.com/office/drawing/2014/main" xmlns="" id="{6C5F675E-E9ED-4257-A4B1-6967ACFAEEBD}"/>
+                          <a16:creationId xmlns="" xmlns:a16="http://schemas.microsoft.com/office/drawing/2014/main" id="{6C5F675E-E9ED-4257-A4B1-6967ACFAEEBD}"/>
                         </a:ext>
                       </a:extLst>
                     </p:cNvPr>
@@ -6205,7 +6137,7 @@
                     <p:cNvPr id="95" name="Oval 94">
                       <a:extLst>
                         <a:ext uri="{FF2B5EF4-FFF2-40B4-BE49-F238E27FC236}">
-                          <a16:creationId xmlns:a16="http://schemas.microsoft.com/office/drawing/2014/main" xmlns="" id="{8B0019AD-26DD-4D55-B6F3-28C6FA61B22A}"/>
+                          <a16:creationId xmlns="" xmlns:a16="http://schemas.microsoft.com/office/drawing/2014/main" id="{8B0019AD-26DD-4D55-B6F3-28C6FA61B22A}"/>
                         </a:ext>
                       </a:extLst>
                     </p:cNvPr>
@@ -6267,7 +6199,7 @@
                   <p:cNvPr id="89" name="TextBox 88">
                     <a:extLst>
                       <a:ext uri="{FF2B5EF4-FFF2-40B4-BE49-F238E27FC236}">
-                        <a16:creationId xmlns:a16="http://schemas.microsoft.com/office/drawing/2014/main" xmlns="" id="{769F6646-723D-4B62-90E2-4FDD4C0F3BE1}"/>
+                        <a16:creationId xmlns="" xmlns:a16="http://schemas.microsoft.com/office/drawing/2014/main" id="{769F6646-723D-4B62-90E2-4FDD4C0F3BE1}"/>
                       </a:ext>
                     </a:extLst>
                   </p:cNvPr>
@@ -6307,7 +6239,7 @@
                   <p:cNvPr id="90" name="TextBox 89">
                     <a:extLst>
                       <a:ext uri="{FF2B5EF4-FFF2-40B4-BE49-F238E27FC236}">
-                        <a16:creationId xmlns:a16="http://schemas.microsoft.com/office/drawing/2014/main" xmlns="" id="{B5FCEA77-DB72-4B9B-896F-CAF0FBB8824F}"/>
+                        <a16:creationId xmlns="" xmlns:a16="http://schemas.microsoft.com/office/drawing/2014/main" id="{B5FCEA77-DB72-4B9B-896F-CAF0FBB8824F}"/>
                       </a:ext>
                     </a:extLst>
                   </p:cNvPr>
@@ -6356,7 +6288,7 @@
                 <p:cNvPr id="87" name="TextBox 86">
                   <a:extLst>
                     <a:ext uri="{FF2B5EF4-FFF2-40B4-BE49-F238E27FC236}">
-                      <a16:creationId xmlns:a16="http://schemas.microsoft.com/office/drawing/2014/main" xmlns="" id="{E08231CB-4975-45E2-90E2-711E4C0623A6}"/>
+                      <a16:creationId xmlns="" xmlns:a16="http://schemas.microsoft.com/office/drawing/2014/main" id="{E08231CB-4975-45E2-90E2-711E4C0623A6}"/>
                     </a:ext>
                   </a:extLst>
                 </p:cNvPr>
@@ -6396,7 +6328,7 @@
               <p:cNvPr id="85" name="TextBox 84">
                 <a:extLst>
                   <a:ext uri="{FF2B5EF4-FFF2-40B4-BE49-F238E27FC236}">
-                    <a16:creationId xmlns:a16="http://schemas.microsoft.com/office/drawing/2014/main" xmlns="" id="{886800C3-39F3-4CA3-982B-091775F9BEF2}"/>
+                    <a16:creationId xmlns="" xmlns:a16="http://schemas.microsoft.com/office/drawing/2014/main" id="{886800C3-39F3-4CA3-982B-091775F9BEF2}"/>
                   </a:ext>
                 </a:extLst>
               </p:cNvPr>
@@ -6436,7 +6368,7 @@
             <p:cNvPr id="83" name="TextBox 82">
               <a:extLst>
                 <a:ext uri="{FF2B5EF4-FFF2-40B4-BE49-F238E27FC236}">
-                  <a16:creationId xmlns:a16="http://schemas.microsoft.com/office/drawing/2014/main" xmlns="" id="{BFD105B3-ED68-4F24-89BC-2C52177327D7}"/>
+                  <a16:creationId xmlns="" xmlns:a16="http://schemas.microsoft.com/office/drawing/2014/main" id="{BFD105B3-ED68-4F24-89BC-2C52177327D7}"/>
                 </a:ext>
               </a:extLst>
             </p:cNvPr>
@@ -6480,7 +6412,7 @@
           <p:cNvPr id="97" name="Group 96">
             <a:extLst>
               <a:ext uri="{FF2B5EF4-FFF2-40B4-BE49-F238E27FC236}">
-                <a16:creationId xmlns:a16="http://schemas.microsoft.com/office/drawing/2014/main" xmlns="" id="{1DEF5049-24D5-4A7F-A457-1D43B9295BBC}"/>
+                <a16:creationId xmlns="" xmlns:a16="http://schemas.microsoft.com/office/drawing/2014/main" id="{1DEF5049-24D5-4A7F-A457-1D43B9295BBC}"/>
               </a:ext>
             </a:extLst>
           </p:cNvPr>
@@ -6500,7 +6432,7 @@
             <p:cNvPr id="98" name="Group 97">
               <a:extLst>
                 <a:ext uri="{FF2B5EF4-FFF2-40B4-BE49-F238E27FC236}">
-                  <a16:creationId xmlns:a16="http://schemas.microsoft.com/office/drawing/2014/main" xmlns="" id="{329F01C5-BE82-4F40-AFB5-65E18A2E3DD8}"/>
+                  <a16:creationId xmlns="" xmlns:a16="http://schemas.microsoft.com/office/drawing/2014/main" id="{329F01C5-BE82-4F40-AFB5-65E18A2E3DD8}"/>
                 </a:ext>
               </a:extLst>
             </p:cNvPr>
@@ -6520,7 +6452,7 @@
               <p:cNvPr id="101" name="Oval 100">
                 <a:extLst>
                   <a:ext uri="{FF2B5EF4-FFF2-40B4-BE49-F238E27FC236}">
-                    <a16:creationId xmlns:a16="http://schemas.microsoft.com/office/drawing/2014/main" xmlns="" id="{ABD4714A-2318-43D8-8E69-0959044E5993}"/>
+                    <a16:creationId xmlns="" xmlns:a16="http://schemas.microsoft.com/office/drawing/2014/main" id="{ABD4714A-2318-43D8-8E69-0959044E5993}"/>
                   </a:ext>
                 </a:extLst>
               </p:cNvPr>
@@ -6577,7 +6509,7 @@
               <p:cNvPr id="102" name="Oval 101">
                 <a:extLst>
                   <a:ext uri="{FF2B5EF4-FFF2-40B4-BE49-F238E27FC236}">
-                    <a16:creationId xmlns:a16="http://schemas.microsoft.com/office/drawing/2014/main" xmlns="" id="{F52D2641-E7FB-4F26-BC4A-A3E91AA08E1B}"/>
+                    <a16:creationId xmlns="" xmlns:a16="http://schemas.microsoft.com/office/drawing/2014/main" id="{F52D2641-E7FB-4F26-BC4A-A3E91AA08E1B}"/>
                   </a:ext>
                 </a:extLst>
               </p:cNvPr>
@@ -6634,7 +6566,7 @@
               <p:cNvPr id="103" name="Oval 102">
                 <a:extLst>
                   <a:ext uri="{FF2B5EF4-FFF2-40B4-BE49-F238E27FC236}">
-                    <a16:creationId xmlns:a16="http://schemas.microsoft.com/office/drawing/2014/main" xmlns="" id="{52563AA7-4204-4037-A1E5-A157E64FE63B}"/>
+                    <a16:creationId xmlns="" xmlns:a16="http://schemas.microsoft.com/office/drawing/2014/main" id="{52563AA7-4204-4037-A1E5-A157E64FE63B}"/>
                   </a:ext>
                 </a:extLst>
               </p:cNvPr>
@@ -6692,7 +6624,7 @@
               <p:cNvPr id="104" name="Oval 103">
                 <a:extLst>
                   <a:ext uri="{FF2B5EF4-FFF2-40B4-BE49-F238E27FC236}">
-                    <a16:creationId xmlns:a16="http://schemas.microsoft.com/office/drawing/2014/main" xmlns="" id="{8CE94D1A-A119-4F8B-888B-E3C3DFDFA06C}"/>
+                    <a16:creationId xmlns="" xmlns:a16="http://schemas.microsoft.com/office/drawing/2014/main" id="{8CE94D1A-A119-4F8B-888B-E3C3DFDFA06C}"/>
                   </a:ext>
                 </a:extLst>
               </p:cNvPr>
@@ -6754,7 +6686,7 @@
             <p:cNvPr id="99" name="TextBox 98">
               <a:extLst>
                 <a:ext uri="{FF2B5EF4-FFF2-40B4-BE49-F238E27FC236}">
-                  <a16:creationId xmlns:a16="http://schemas.microsoft.com/office/drawing/2014/main" xmlns="" id="{DDFFC7ED-B194-4FC5-91B0-255B2173939F}"/>
+                  <a16:creationId xmlns="" xmlns:a16="http://schemas.microsoft.com/office/drawing/2014/main" id="{DDFFC7ED-B194-4FC5-91B0-255B2173939F}"/>
                 </a:ext>
               </a:extLst>
             </p:cNvPr>
@@ -6831,7 +6763,7 @@
             <p:cNvPr id="100" name="TextBox 99">
               <a:extLst>
                 <a:ext uri="{FF2B5EF4-FFF2-40B4-BE49-F238E27FC236}">
-                  <a16:creationId xmlns:a16="http://schemas.microsoft.com/office/drawing/2014/main" xmlns="" id="{EAD8081A-6C91-42D7-AAC1-FEDD21D02A3C}"/>
+                  <a16:creationId xmlns="" xmlns:a16="http://schemas.microsoft.com/office/drawing/2014/main" id="{EAD8081A-6C91-42D7-AAC1-FEDD21D02A3C}"/>
                 </a:ext>
               </a:extLst>
             </p:cNvPr>
@@ -6926,295 +6858,7 @@
   <p:timing>
     <p:tnLst>
       <p:par>
-        <p:cTn id="1" dur="indefinite" restart="never" nodeType="tmRoot">
-          <p:childTnLst>
-            <p:seq concurrent="1" nextAc="seek">
-              <p:cTn id="2" dur="indefinite" nodeType="mainSeq">
-                <p:childTnLst>
-                  <p:par>
-                    <p:cTn id="3" fill="hold">
-                      <p:stCondLst>
-                        <p:cond delay="indefinite"/>
-                      </p:stCondLst>
-                      <p:childTnLst>
-                        <p:par>
-                          <p:cTn id="4" fill="hold">
-                            <p:stCondLst>
-                              <p:cond delay="0"/>
-                            </p:stCondLst>
-                            <p:childTnLst>
-                              <p:par>
-                                <p:cTn id="5" presetID="10" presetClass="entr" presetSubtype="0" fill="hold" nodeType="clickEffect">
-                                  <p:stCondLst>
-                                    <p:cond delay="0"/>
-                                  </p:stCondLst>
-                                  <p:childTnLst>
-                                    <p:set>
-                                      <p:cBhvr>
-                                        <p:cTn id="6" dur="1" fill="hold">
-                                          <p:stCondLst>
-                                            <p:cond delay="0"/>
-                                          </p:stCondLst>
-                                        </p:cTn>
-                                        <p:tgtEl>
-                                          <p:spTgt spid="81"/>
-                                        </p:tgtEl>
-                                        <p:attrNameLst>
-                                          <p:attrName>style.visibility</p:attrName>
-                                        </p:attrNameLst>
-                                      </p:cBhvr>
-                                      <p:to>
-                                        <p:strVal val="visible"/>
-                                      </p:to>
-                                    </p:set>
-                                    <p:animEffect transition="in" filter="fade">
-                                      <p:cBhvr>
-                                        <p:cTn id="7" dur="1000"/>
-                                        <p:tgtEl>
-                                          <p:spTgt spid="81"/>
-                                        </p:tgtEl>
-                                      </p:cBhvr>
-                                    </p:animEffect>
-                                  </p:childTnLst>
-                                </p:cTn>
-                              </p:par>
-                            </p:childTnLst>
-                          </p:cTn>
-                        </p:par>
-                      </p:childTnLst>
-                    </p:cTn>
-                  </p:par>
-                  <p:par>
-                    <p:cTn id="8" fill="hold">
-                      <p:stCondLst>
-                        <p:cond delay="indefinite"/>
-                      </p:stCondLst>
-                      <p:childTnLst>
-                        <p:par>
-                          <p:cTn id="9" fill="hold">
-                            <p:stCondLst>
-                              <p:cond delay="0"/>
-                            </p:stCondLst>
-                            <p:childTnLst>
-                              <p:par>
-                                <p:cTn id="10" presetID="10" presetClass="entr" presetSubtype="0" fill="hold" nodeType="clickEffect">
-                                  <p:stCondLst>
-                                    <p:cond delay="0"/>
-                                  </p:stCondLst>
-                                  <p:childTnLst>
-                                    <p:set>
-                                      <p:cBhvr>
-                                        <p:cTn id="11" dur="1" fill="hold">
-                                          <p:stCondLst>
-                                            <p:cond delay="0"/>
-                                          </p:stCondLst>
-                                        </p:cTn>
-                                        <p:tgtEl>
-                                          <p:spTgt spid="69"/>
-                                        </p:tgtEl>
-                                        <p:attrNameLst>
-                                          <p:attrName>style.visibility</p:attrName>
-                                        </p:attrNameLst>
-                                      </p:cBhvr>
-                                      <p:to>
-                                        <p:strVal val="visible"/>
-                                      </p:to>
-                                    </p:set>
-                                    <p:animEffect transition="in" filter="fade">
-                                      <p:cBhvr>
-                                        <p:cTn id="12" dur="1000"/>
-                                        <p:tgtEl>
-                                          <p:spTgt spid="69"/>
-                                        </p:tgtEl>
-                                      </p:cBhvr>
-                                    </p:animEffect>
-                                  </p:childTnLst>
-                                </p:cTn>
-                              </p:par>
-                            </p:childTnLst>
-                          </p:cTn>
-                        </p:par>
-                      </p:childTnLst>
-                    </p:cTn>
-                  </p:par>
-                  <p:par>
-                    <p:cTn id="13" fill="hold">
-                      <p:stCondLst>
-                        <p:cond delay="indefinite"/>
-                      </p:stCondLst>
-                      <p:childTnLst>
-                        <p:par>
-                          <p:cTn id="14" fill="hold">
-                            <p:stCondLst>
-                              <p:cond delay="0"/>
-                            </p:stCondLst>
-                            <p:childTnLst>
-                              <p:par>
-                                <p:cTn id="15" presetID="10" presetClass="entr" presetSubtype="0" fill="hold" nodeType="clickEffect">
-                                  <p:stCondLst>
-                                    <p:cond delay="0"/>
-                                  </p:stCondLst>
-                                  <p:childTnLst>
-                                    <p:set>
-                                      <p:cBhvr>
-                                        <p:cTn id="16" dur="1" fill="hold">
-                                          <p:stCondLst>
-                                            <p:cond delay="0"/>
-                                          </p:stCondLst>
-                                        </p:cTn>
-                                        <p:tgtEl>
-                                          <p:spTgt spid="57"/>
-                                        </p:tgtEl>
-                                        <p:attrNameLst>
-                                          <p:attrName>style.visibility</p:attrName>
-                                        </p:attrNameLst>
-                                      </p:cBhvr>
-                                      <p:to>
-                                        <p:strVal val="visible"/>
-                                      </p:to>
-                                    </p:set>
-                                    <p:animEffect transition="in" filter="fade">
-                                      <p:cBhvr>
-                                        <p:cTn id="17" dur="1000"/>
-                                        <p:tgtEl>
-                                          <p:spTgt spid="57"/>
-                                        </p:tgtEl>
-                                      </p:cBhvr>
-                                    </p:animEffect>
-                                  </p:childTnLst>
-                                </p:cTn>
-                              </p:par>
-                            </p:childTnLst>
-                          </p:cTn>
-                        </p:par>
-                      </p:childTnLst>
-                    </p:cTn>
-                  </p:par>
-                  <p:par>
-                    <p:cTn id="18" fill="hold">
-                      <p:stCondLst>
-                        <p:cond delay="indefinite"/>
-                      </p:stCondLst>
-                      <p:childTnLst>
-                        <p:par>
-                          <p:cTn id="19" fill="hold">
-                            <p:stCondLst>
-                              <p:cond delay="0"/>
-                            </p:stCondLst>
-                            <p:childTnLst>
-                              <p:par>
-                                <p:cTn id="20" presetID="10" presetClass="entr" presetSubtype="0" fill="hold" nodeType="clickEffect">
-                                  <p:stCondLst>
-                                    <p:cond delay="0"/>
-                                  </p:stCondLst>
-                                  <p:childTnLst>
-                                    <p:set>
-                                      <p:cBhvr>
-                                        <p:cTn id="21" dur="1" fill="hold">
-                                          <p:stCondLst>
-                                            <p:cond delay="0"/>
-                                          </p:stCondLst>
-                                        </p:cTn>
-                                        <p:tgtEl>
-                                          <p:spTgt spid="40"/>
-                                        </p:tgtEl>
-                                        <p:attrNameLst>
-                                          <p:attrName>style.visibility</p:attrName>
-                                        </p:attrNameLst>
-                                      </p:cBhvr>
-                                      <p:to>
-                                        <p:strVal val="visible"/>
-                                      </p:to>
-                                    </p:set>
-                                    <p:animEffect transition="in" filter="fade">
-                                      <p:cBhvr>
-                                        <p:cTn id="22" dur="1000"/>
-                                        <p:tgtEl>
-                                          <p:spTgt spid="40"/>
-                                        </p:tgtEl>
-                                      </p:cBhvr>
-                                    </p:animEffect>
-                                  </p:childTnLst>
-                                </p:cTn>
-                              </p:par>
-                            </p:childTnLst>
-                          </p:cTn>
-                        </p:par>
-                      </p:childTnLst>
-                    </p:cTn>
-                  </p:par>
-                  <p:par>
-                    <p:cTn id="23" fill="hold">
-                      <p:stCondLst>
-                        <p:cond delay="indefinite"/>
-                      </p:stCondLst>
-                      <p:childTnLst>
-                        <p:par>
-                          <p:cTn id="24" fill="hold">
-                            <p:stCondLst>
-                              <p:cond delay="0"/>
-                            </p:stCondLst>
-                            <p:childTnLst>
-                              <p:par>
-                                <p:cTn id="25" presetID="10" presetClass="entr" presetSubtype="0" fill="hold" nodeType="clickEffect">
-                                  <p:stCondLst>
-                                    <p:cond delay="0"/>
-                                  </p:stCondLst>
-                                  <p:childTnLst>
-                                    <p:set>
-                                      <p:cBhvr>
-                                        <p:cTn id="26" dur="1" fill="hold">
-                                          <p:stCondLst>
-                                            <p:cond delay="0"/>
-                                          </p:stCondLst>
-                                        </p:cTn>
-                                        <p:tgtEl>
-                                          <p:spTgt spid="25"/>
-                                        </p:tgtEl>
-                                        <p:attrNameLst>
-                                          <p:attrName>style.visibility</p:attrName>
-                                        </p:attrNameLst>
-                                      </p:cBhvr>
-                                      <p:to>
-                                        <p:strVal val="visible"/>
-                                      </p:to>
-                                    </p:set>
-                                    <p:animEffect transition="in" filter="fade">
-                                      <p:cBhvr>
-                                        <p:cTn id="27" dur="1000"/>
-                                        <p:tgtEl>
-                                          <p:spTgt spid="25"/>
-                                        </p:tgtEl>
-                                      </p:cBhvr>
-                                    </p:animEffect>
-                                  </p:childTnLst>
-                                </p:cTn>
-                              </p:par>
-                            </p:childTnLst>
-                          </p:cTn>
-                        </p:par>
-                      </p:childTnLst>
-                    </p:cTn>
-                  </p:par>
-                </p:childTnLst>
-              </p:cTn>
-              <p:prevCondLst>
-                <p:cond evt="onPrev" delay="0">
-                  <p:tgtEl>
-                    <p:sldTgt/>
-                  </p:tgtEl>
-                </p:cond>
-              </p:prevCondLst>
-              <p:nextCondLst>
-                <p:cond evt="onNext" delay="0">
-                  <p:tgtEl>
-                    <p:sldTgt/>
-                  </p:tgtEl>
-                </p:cond>
-              </p:nextCondLst>
-            </p:seq>
-          </p:childTnLst>
-        </p:cTn>
+        <p:cTn id="1" dur="indefinite" restart="never" nodeType="tmRoot"/>
       </p:par>
     </p:tnLst>
   </p:timing>
@@ -7243,7 +6887,7 @@
           <p:cNvPr id="147" name="Group 146">
             <a:extLst>
               <a:ext uri="{FF2B5EF4-FFF2-40B4-BE49-F238E27FC236}">
-                <a16:creationId xmlns:a16="http://schemas.microsoft.com/office/drawing/2014/main" xmlns="" id="{709C87B8-071F-42C2-A8DE-A6051E84C197}"/>
+                <a16:creationId xmlns="" xmlns:a16="http://schemas.microsoft.com/office/drawing/2014/main" id="{709C87B8-071F-42C2-A8DE-A6051E84C197}"/>
               </a:ext>
             </a:extLst>
           </p:cNvPr>
@@ -7263,7 +6907,7 @@
             <p:cNvPr id="148" name="Group 147">
               <a:extLst>
                 <a:ext uri="{FF2B5EF4-FFF2-40B4-BE49-F238E27FC236}">
-                  <a16:creationId xmlns:a16="http://schemas.microsoft.com/office/drawing/2014/main" xmlns="" id="{026999E9-F9F8-4E8A-AB5E-C475BCC958D9}"/>
+                  <a16:creationId xmlns="" xmlns:a16="http://schemas.microsoft.com/office/drawing/2014/main" id="{026999E9-F9F8-4E8A-AB5E-C475BCC958D9}"/>
                 </a:ext>
               </a:extLst>
             </p:cNvPr>
@@ -7731,7 +7375,7 @@
               <p:cNvPr id="151" name="TextBox 150">
                 <a:extLst>
                   <a:ext uri="{FF2B5EF4-FFF2-40B4-BE49-F238E27FC236}">
-                    <a16:creationId xmlns:a16="http://schemas.microsoft.com/office/drawing/2014/main" xmlns="" id="{8C8A0BB9-1357-4728-9CE7-3CE202F53E59}"/>
+                    <a16:creationId xmlns="" xmlns:a16="http://schemas.microsoft.com/office/drawing/2014/main" id="{8C8A0BB9-1357-4728-9CE7-3CE202F53E59}"/>
                   </a:ext>
                 </a:extLst>
               </p:cNvPr>
@@ -7772,7 +7416,7 @@
             <p:cNvPr id="149" name="TextBox 148">
               <a:extLst>
                 <a:ext uri="{FF2B5EF4-FFF2-40B4-BE49-F238E27FC236}">
-                  <a16:creationId xmlns:a16="http://schemas.microsoft.com/office/drawing/2014/main" xmlns="" id="{D623C965-D1FD-4C88-8FD5-732CFAFE6BFD}"/>
+                  <a16:creationId xmlns="" xmlns:a16="http://schemas.microsoft.com/office/drawing/2014/main" id="{D623C965-D1FD-4C88-8FD5-732CFAFE6BFD}"/>
                 </a:ext>
               </a:extLst>
             </p:cNvPr>
@@ -7816,7 +7460,7 @@
           <p:cNvPr id="164" name="Group 163">
             <a:extLst>
               <a:ext uri="{FF2B5EF4-FFF2-40B4-BE49-F238E27FC236}">
-                <a16:creationId xmlns:a16="http://schemas.microsoft.com/office/drawing/2014/main" xmlns="" id="{1378DE23-7D62-478B-95BE-FF73F0228F81}"/>
+                <a16:creationId xmlns="" xmlns:a16="http://schemas.microsoft.com/office/drawing/2014/main" id="{1378DE23-7D62-478B-95BE-FF73F0228F81}"/>
               </a:ext>
             </a:extLst>
           </p:cNvPr>
@@ -8174,7 +7818,7 @@
             <p:cNvPr id="166" name="TextBox 165">
               <a:extLst>
                 <a:ext uri="{FF2B5EF4-FFF2-40B4-BE49-F238E27FC236}">
-                  <a16:creationId xmlns:a16="http://schemas.microsoft.com/office/drawing/2014/main" xmlns="" id="{7472ED37-5D8A-4600-8965-599DD324EE41}"/>
+                  <a16:creationId xmlns="" xmlns:a16="http://schemas.microsoft.com/office/drawing/2014/main" id="{7472ED37-5D8A-4600-8965-599DD324EE41}"/>
                 </a:ext>
               </a:extLst>
             </p:cNvPr>
@@ -8218,7 +7862,7 @@
           <p:cNvPr id="175" name="Group 174">
             <a:extLst>
               <a:ext uri="{FF2B5EF4-FFF2-40B4-BE49-F238E27FC236}">
-                <a16:creationId xmlns:a16="http://schemas.microsoft.com/office/drawing/2014/main" xmlns="" id="{74B26ABE-DB48-4D22-8605-448C2C9BB469}"/>
+                <a16:creationId xmlns="" xmlns:a16="http://schemas.microsoft.com/office/drawing/2014/main" id="{74B26ABE-DB48-4D22-8605-448C2C9BB469}"/>
               </a:ext>
             </a:extLst>
           </p:cNvPr>
@@ -8238,7 +7882,7 @@
             <p:cNvPr id="176" name="Group 175">
               <a:extLst>
                 <a:ext uri="{FF2B5EF4-FFF2-40B4-BE49-F238E27FC236}">
-                  <a16:creationId xmlns:a16="http://schemas.microsoft.com/office/drawing/2014/main" xmlns="" id="{882FBE51-C2A6-41EB-ACE8-745B20AA2BA5}"/>
+                  <a16:creationId xmlns="" xmlns:a16="http://schemas.microsoft.com/office/drawing/2014/main" id="{882FBE51-C2A6-41EB-ACE8-745B20AA2BA5}"/>
                 </a:ext>
               </a:extLst>
             </p:cNvPr>
@@ -8673,7 +8317,7 @@
               <p:cNvPr id="179" name="TextBox 178">
                 <a:extLst>
                   <a:ext uri="{FF2B5EF4-FFF2-40B4-BE49-F238E27FC236}">
-                    <a16:creationId xmlns:a16="http://schemas.microsoft.com/office/drawing/2014/main" xmlns="" id="{C3908C2E-2C90-4F2E-A289-A4C95B6B9AAE}"/>
+                    <a16:creationId xmlns="" xmlns:a16="http://schemas.microsoft.com/office/drawing/2014/main" id="{C3908C2E-2C90-4F2E-A289-A4C95B6B9AAE}"/>
                   </a:ext>
                 </a:extLst>
               </p:cNvPr>
@@ -8713,7 +8357,7 @@
             <p:cNvPr id="177" name="TextBox 176">
               <a:extLst>
                 <a:ext uri="{FF2B5EF4-FFF2-40B4-BE49-F238E27FC236}">
-                  <a16:creationId xmlns:a16="http://schemas.microsoft.com/office/drawing/2014/main" xmlns="" id="{EC5C7B60-870A-4939-AA11-8153EC33E6FE}"/>
+                  <a16:creationId xmlns="" xmlns:a16="http://schemas.microsoft.com/office/drawing/2014/main" id="{EC5C7B60-870A-4939-AA11-8153EC33E6FE}"/>
                 </a:ext>
               </a:extLst>
             </p:cNvPr>
@@ -8757,7 +8401,7 @@
           <p:cNvPr id="191" name="Group 190">
             <a:extLst>
               <a:ext uri="{FF2B5EF4-FFF2-40B4-BE49-F238E27FC236}">
-                <a16:creationId xmlns:a16="http://schemas.microsoft.com/office/drawing/2014/main" xmlns="" id="{7E8B3428-E8FD-4A97-AD4A-DB1DC838EEC4}"/>
+                <a16:creationId xmlns="" xmlns:a16="http://schemas.microsoft.com/office/drawing/2014/main" id="{7E8B3428-E8FD-4A97-AD4A-DB1DC838EEC4}"/>
               </a:ext>
             </a:extLst>
           </p:cNvPr>
@@ -8777,7 +8421,7 @@
             <p:cNvPr id="192" name="Group 191">
               <a:extLst>
                 <a:ext uri="{FF2B5EF4-FFF2-40B4-BE49-F238E27FC236}">
-                  <a16:creationId xmlns:a16="http://schemas.microsoft.com/office/drawing/2014/main" xmlns="" id="{38A24F48-A60F-4057-8B81-29F7C7B2F779}"/>
+                  <a16:creationId xmlns="" xmlns:a16="http://schemas.microsoft.com/office/drawing/2014/main" id="{38A24F48-A60F-4057-8B81-29F7C7B2F779}"/>
                 </a:ext>
               </a:extLst>
             </p:cNvPr>
@@ -9197,7 +8841,7 @@
               <p:cNvPr id="195" name="TextBox 194">
                 <a:extLst>
                   <a:ext uri="{FF2B5EF4-FFF2-40B4-BE49-F238E27FC236}">
-                    <a16:creationId xmlns:a16="http://schemas.microsoft.com/office/drawing/2014/main" xmlns="" id="{7327F190-3648-457A-A36D-AE45D82F81C0}"/>
+                    <a16:creationId xmlns="" xmlns:a16="http://schemas.microsoft.com/office/drawing/2014/main" id="{7327F190-3648-457A-A36D-AE45D82F81C0}"/>
                   </a:ext>
                 </a:extLst>
               </p:cNvPr>
@@ -9238,7 +8882,7 @@
             <p:cNvPr id="193" name="TextBox 192">
               <a:extLst>
                 <a:ext uri="{FF2B5EF4-FFF2-40B4-BE49-F238E27FC236}">
-                  <a16:creationId xmlns:a16="http://schemas.microsoft.com/office/drawing/2014/main" xmlns="" id="{1C557B58-0D37-4554-ACA8-7C203D39099B}"/>
+                  <a16:creationId xmlns="" xmlns:a16="http://schemas.microsoft.com/office/drawing/2014/main" id="{1C557B58-0D37-4554-ACA8-7C203D39099B}"/>
                 </a:ext>
               </a:extLst>
             </p:cNvPr>
@@ -9282,7 +8926,7 @@
           <p:cNvPr id="98" name="Group 97">
             <a:extLst>
               <a:ext uri="{FF2B5EF4-FFF2-40B4-BE49-F238E27FC236}">
-                <a16:creationId xmlns:a16="http://schemas.microsoft.com/office/drawing/2014/main" xmlns="" id="{E5336EE1-F72C-42F3-A99C-BE09D41EDB9C}"/>
+                <a16:creationId xmlns="" xmlns:a16="http://schemas.microsoft.com/office/drawing/2014/main" id="{E5336EE1-F72C-42F3-A99C-BE09D41EDB9C}"/>
               </a:ext>
             </a:extLst>
           </p:cNvPr>
@@ -9302,7 +8946,7 @@
             <p:cNvPr id="99" name="Group 98">
               <a:extLst>
                 <a:ext uri="{FF2B5EF4-FFF2-40B4-BE49-F238E27FC236}">
-                  <a16:creationId xmlns:a16="http://schemas.microsoft.com/office/drawing/2014/main" xmlns="" id="{DA6BEE02-34B8-4E94-88FA-4E084F83BD43}"/>
+                  <a16:creationId xmlns="" xmlns:a16="http://schemas.microsoft.com/office/drawing/2014/main" id="{DA6BEE02-34B8-4E94-88FA-4E084F83BD43}"/>
                 </a:ext>
               </a:extLst>
             </p:cNvPr>
@@ -9322,7 +8966,7 @@
               <p:cNvPr id="102" name="Oval 101">
                 <a:extLst>
                   <a:ext uri="{FF2B5EF4-FFF2-40B4-BE49-F238E27FC236}">
-                    <a16:creationId xmlns:a16="http://schemas.microsoft.com/office/drawing/2014/main" xmlns="" id="{AA46D433-78B8-4FA2-AC49-23EF9963D6FD}"/>
+                    <a16:creationId xmlns="" xmlns:a16="http://schemas.microsoft.com/office/drawing/2014/main" id="{AA46D433-78B8-4FA2-AC49-23EF9963D6FD}"/>
                   </a:ext>
                 </a:extLst>
               </p:cNvPr>
@@ -9379,7 +9023,7 @@
               <p:cNvPr id="103" name="Oval 102">
                 <a:extLst>
                   <a:ext uri="{FF2B5EF4-FFF2-40B4-BE49-F238E27FC236}">
-                    <a16:creationId xmlns:a16="http://schemas.microsoft.com/office/drawing/2014/main" xmlns="" id="{942893DB-3A2A-4441-9E4F-0D1FB4D67DFF}"/>
+                    <a16:creationId xmlns="" xmlns:a16="http://schemas.microsoft.com/office/drawing/2014/main" id="{942893DB-3A2A-4441-9E4F-0D1FB4D67DFF}"/>
                   </a:ext>
                 </a:extLst>
               </p:cNvPr>
@@ -9436,7 +9080,7 @@
               <p:cNvPr id="104" name="Oval 103">
                 <a:extLst>
                   <a:ext uri="{FF2B5EF4-FFF2-40B4-BE49-F238E27FC236}">
-                    <a16:creationId xmlns:a16="http://schemas.microsoft.com/office/drawing/2014/main" xmlns="" id="{61D7BD8E-8BD1-46D0-90CB-79BC639E68C1}"/>
+                    <a16:creationId xmlns="" xmlns:a16="http://schemas.microsoft.com/office/drawing/2014/main" id="{61D7BD8E-8BD1-46D0-90CB-79BC639E68C1}"/>
                   </a:ext>
                 </a:extLst>
               </p:cNvPr>
@@ -9494,7 +9138,7 @@
               <p:cNvPr id="105" name="Oval 104">
                 <a:extLst>
                   <a:ext uri="{FF2B5EF4-FFF2-40B4-BE49-F238E27FC236}">
-                    <a16:creationId xmlns:a16="http://schemas.microsoft.com/office/drawing/2014/main" xmlns="" id="{EC157B00-ADC1-462E-89ED-43675A451350}"/>
+                    <a16:creationId xmlns="" xmlns:a16="http://schemas.microsoft.com/office/drawing/2014/main" id="{EC157B00-ADC1-462E-89ED-43675A451350}"/>
                   </a:ext>
                 </a:extLst>
               </p:cNvPr>
@@ -9556,7 +9200,7 @@
             <p:cNvPr id="100" name="TextBox 99">
               <a:extLst>
                 <a:ext uri="{FF2B5EF4-FFF2-40B4-BE49-F238E27FC236}">
-                  <a16:creationId xmlns:a16="http://schemas.microsoft.com/office/drawing/2014/main" xmlns="" id="{B88448C8-D2A6-49B1-B1FD-3D31B70D6110}"/>
+                  <a16:creationId xmlns="" xmlns:a16="http://schemas.microsoft.com/office/drawing/2014/main" id="{B88448C8-D2A6-49B1-B1FD-3D31B70D6110}"/>
                 </a:ext>
               </a:extLst>
             </p:cNvPr>
@@ -9633,7 +9277,7 @@
             <p:cNvPr id="101" name="TextBox 100">
               <a:extLst>
                 <a:ext uri="{FF2B5EF4-FFF2-40B4-BE49-F238E27FC236}">
-                  <a16:creationId xmlns:a16="http://schemas.microsoft.com/office/drawing/2014/main" xmlns="" id="{9D4CDA77-EACB-4F55-A96F-C0829D4AD59E}"/>
+                  <a16:creationId xmlns="" xmlns:a16="http://schemas.microsoft.com/office/drawing/2014/main" id="{9D4CDA77-EACB-4F55-A96F-C0829D4AD59E}"/>
                 </a:ext>
               </a:extLst>
             </p:cNvPr>
@@ -9716,242 +9360,7 @@
   <p:timing>
     <p:tnLst>
       <p:par>
-        <p:cTn id="1" dur="indefinite" restart="never" nodeType="tmRoot">
-          <p:childTnLst>
-            <p:seq concurrent="1" nextAc="seek">
-              <p:cTn id="2" dur="indefinite" nodeType="mainSeq">
-                <p:childTnLst>
-                  <p:par>
-                    <p:cTn id="3" fill="hold">
-                      <p:stCondLst>
-                        <p:cond delay="indefinite"/>
-                      </p:stCondLst>
-                      <p:childTnLst>
-                        <p:par>
-                          <p:cTn id="4" fill="hold">
-                            <p:stCondLst>
-                              <p:cond delay="0"/>
-                            </p:stCondLst>
-                            <p:childTnLst>
-                              <p:par>
-                                <p:cTn id="5" presetID="10" presetClass="entr" presetSubtype="0" fill="hold" nodeType="clickEffect">
-                                  <p:stCondLst>
-                                    <p:cond delay="0"/>
-                                  </p:stCondLst>
-                                  <p:childTnLst>
-                                    <p:set>
-                                      <p:cBhvr>
-                                        <p:cTn id="6" dur="1" fill="hold">
-                                          <p:stCondLst>
-                                            <p:cond delay="0"/>
-                                          </p:stCondLst>
-                                        </p:cTn>
-                                        <p:tgtEl>
-                                          <p:spTgt spid="175"/>
-                                        </p:tgtEl>
-                                        <p:attrNameLst>
-                                          <p:attrName>style.visibility</p:attrName>
-                                        </p:attrNameLst>
-                                      </p:cBhvr>
-                                      <p:to>
-                                        <p:strVal val="visible"/>
-                                      </p:to>
-                                    </p:set>
-                                    <p:animEffect transition="in" filter="fade">
-                                      <p:cBhvr>
-                                        <p:cTn id="7" dur="1000"/>
-                                        <p:tgtEl>
-                                          <p:spTgt spid="175"/>
-                                        </p:tgtEl>
-                                      </p:cBhvr>
-                                    </p:animEffect>
-                                  </p:childTnLst>
-                                </p:cTn>
-                              </p:par>
-                            </p:childTnLst>
-                          </p:cTn>
-                        </p:par>
-                      </p:childTnLst>
-                    </p:cTn>
-                  </p:par>
-                  <p:par>
-                    <p:cTn id="8" fill="hold">
-                      <p:stCondLst>
-                        <p:cond delay="indefinite"/>
-                      </p:stCondLst>
-                      <p:childTnLst>
-                        <p:par>
-                          <p:cTn id="9" fill="hold">
-                            <p:stCondLst>
-                              <p:cond delay="0"/>
-                            </p:stCondLst>
-                            <p:childTnLst>
-                              <p:par>
-                                <p:cTn id="10" presetID="10" presetClass="entr" presetSubtype="0" fill="hold" nodeType="clickEffect">
-                                  <p:stCondLst>
-                                    <p:cond delay="0"/>
-                                  </p:stCondLst>
-                                  <p:childTnLst>
-                                    <p:set>
-                                      <p:cBhvr>
-                                        <p:cTn id="11" dur="1" fill="hold">
-                                          <p:stCondLst>
-                                            <p:cond delay="0"/>
-                                          </p:stCondLst>
-                                        </p:cTn>
-                                        <p:tgtEl>
-                                          <p:spTgt spid="147"/>
-                                        </p:tgtEl>
-                                        <p:attrNameLst>
-                                          <p:attrName>style.visibility</p:attrName>
-                                        </p:attrNameLst>
-                                      </p:cBhvr>
-                                      <p:to>
-                                        <p:strVal val="visible"/>
-                                      </p:to>
-                                    </p:set>
-                                    <p:animEffect transition="in" filter="fade">
-                                      <p:cBhvr>
-                                        <p:cTn id="12" dur="1000"/>
-                                        <p:tgtEl>
-                                          <p:spTgt spid="147"/>
-                                        </p:tgtEl>
-                                      </p:cBhvr>
-                                    </p:animEffect>
-                                  </p:childTnLst>
-                                </p:cTn>
-                              </p:par>
-                            </p:childTnLst>
-                          </p:cTn>
-                        </p:par>
-                      </p:childTnLst>
-                    </p:cTn>
-                  </p:par>
-                  <p:par>
-                    <p:cTn id="13" fill="hold">
-                      <p:stCondLst>
-                        <p:cond delay="indefinite"/>
-                      </p:stCondLst>
-                      <p:childTnLst>
-                        <p:par>
-                          <p:cTn id="14" fill="hold">
-                            <p:stCondLst>
-                              <p:cond delay="0"/>
-                            </p:stCondLst>
-                            <p:childTnLst>
-                              <p:par>
-                                <p:cTn id="15" presetID="10" presetClass="entr" presetSubtype="0" fill="hold" nodeType="clickEffect">
-                                  <p:stCondLst>
-                                    <p:cond delay="0"/>
-                                  </p:stCondLst>
-                                  <p:childTnLst>
-                                    <p:set>
-                                      <p:cBhvr>
-                                        <p:cTn id="16" dur="1" fill="hold">
-                                          <p:stCondLst>
-                                            <p:cond delay="0"/>
-                                          </p:stCondLst>
-                                        </p:cTn>
-                                        <p:tgtEl>
-                                          <p:spTgt spid="191"/>
-                                        </p:tgtEl>
-                                        <p:attrNameLst>
-                                          <p:attrName>style.visibility</p:attrName>
-                                        </p:attrNameLst>
-                                      </p:cBhvr>
-                                      <p:to>
-                                        <p:strVal val="visible"/>
-                                      </p:to>
-                                    </p:set>
-                                    <p:animEffect transition="in" filter="fade">
-                                      <p:cBhvr>
-                                        <p:cTn id="17" dur="1000"/>
-                                        <p:tgtEl>
-                                          <p:spTgt spid="191"/>
-                                        </p:tgtEl>
-                                      </p:cBhvr>
-                                    </p:animEffect>
-                                  </p:childTnLst>
-                                </p:cTn>
-                              </p:par>
-                            </p:childTnLst>
-                          </p:cTn>
-                        </p:par>
-                      </p:childTnLst>
-                    </p:cTn>
-                  </p:par>
-                  <p:par>
-                    <p:cTn id="18" fill="hold">
-                      <p:stCondLst>
-                        <p:cond delay="indefinite"/>
-                      </p:stCondLst>
-                      <p:childTnLst>
-                        <p:par>
-                          <p:cTn id="19" fill="hold">
-                            <p:stCondLst>
-                              <p:cond delay="0"/>
-                            </p:stCondLst>
-                            <p:childTnLst>
-                              <p:par>
-                                <p:cTn id="20" presetID="10" presetClass="entr" presetSubtype="0" fill="hold" nodeType="clickEffect">
-                                  <p:stCondLst>
-                                    <p:cond delay="0"/>
-                                  </p:stCondLst>
-                                  <p:childTnLst>
-                                    <p:set>
-                                      <p:cBhvr>
-                                        <p:cTn id="21" dur="1" fill="hold">
-                                          <p:stCondLst>
-                                            <p:cond delay="0"/>
-                                          </p:stCondLst>
-                                        </p:cTn>
-                                        <p:tgtEl>
-                                          <p:spTgt spid="164"/>
-                                        </p:tgtEl>
-                                        <p:attrNameLst>
-                                          <p:attrName>style.visibility</p:attrName>
-                                        </p:attrNameLst>
-                                      </p:cBhvr>
-                                      <p:to>
-                                        <p:strVal val="visible"/>
-                                      </p:to>
-                                    </p:set>
-                                    <p:animEffect transition="in" filter="fade">
-                                      <p:cBhvr>
-                                        <p:cTn id="22" dur="1000"/>
-                                        <p:tgtEl>
-                                          <p:spTgt spid="164"/>
-                                        </p:tgtEl>
-                                      </p:cBhvr>
-                                    </p:animEffect>
-                                  </p:childTnLst>
-                                </p:cTn>
-                              </p:par>
-                            </p:childTnLst>
-                          </p:cTn>
-                        </p:par>
-                      </p:childTnLst>
-                    </p:cTn>
-                  </p:par>
-                </p:childTnLst>
-              </p:cTn>
-              <p:prevCondLst>
-                <p:cond evt="onPrev" delay="0">
-                  <p:tgtEl>
-                    <p:sldTgt/>
-                  </p:tgtEl>
-                </p:cond>
-              </p:prevCondLst>
-              <p:nextCondLst>
-                <p:cond evt="onNext" delay="0">
-                  <p:tgtEl>
-                    <p:sldTgt/>
-                  </p:tgtEl>
-                </p:cond>
-              </p:nextCondLst>
-            </p:seq>
-          </p:childTnLst>
-        </p:cTn>
+        <p:cTn id="1" dur="indefinite" restart="never" nodeType="tmRoot"/>
       </p:par>
     </p:tnLst>
   </p:timing>

</xml_diff>